<commit_message>
Agregando carpeta con scripts
</commit_message>
<xml_diff>
--- a/src/assets/Documentación/TIF_Store_presentación.pptx
+++ b/src/assets/Documentación/TIF_Store_presentación.pptx
@@ -4970,12 +4970,8 @@
           <a:lstStyle/>
           <a:p>
             <a:r>
-              <a:rPr lang="es-PE" dirty="0" err="1"/>
-              <a:t>EMarzo</a:t>
-            </a:r>
-            <a:r>
               <a:rPr lang="es-PE" dirty="0"/>
-              <a:t> 2023</a:t>
+              <a:t>Marzo 2023</a:t>
             </a:r>
           </a:p>
         </p:txBody>
@@ -9635,26 +9631,6 @@
 </file>
 
 <file path=customXml/item1.xml><?xml version="1.0" encoding="utf-8"?>
-<p:properties xmlns:p="http://schemas.microsoft.com/office/2006/metadata/properties" xmlns:xsi="http://www.w3.org/2001/XMLSchema-instance" xmlns:pc="http://schemas.microsoft.com/office/infopath/2007/PartnerControls">
-  <documentManagement>
-    <TaxCatchAll xmlns="edf58c9f-4424-4ea8-80f2-eb9a1fbfbbf7" xsi:nil="true"/>
-    <lcf76f155ced4ddcb4097134ff3c332f xmlns="c876746a-ac9c-4dfb-b1cf-ee0dcc9f29c1">
-      <Terms xmlns="http://schemas.microsoft.com/office/infopath/2007/PartnerControls"/>
-    </lcf76f155ced4ddcb4097134ff3c332f>
-  </documentManagement>
-</p:properties>
-</file>
-
-<file path=customXml/item2.xml><?xml version="1.0" encoding="utf-8"?>
-<?mso-contentType ?>
-<FormTemplates xmlns="http://schemas.microsoft.com/sharepoint/v3/contenttype/forms">
-  <Display>DocumentLibraryForm</Display>
-  <Edit>DocumentLibraryForm</Edit>
-  <New>DocumentLibraryForm</New>
-</FormTemplates>
-</file>
-
-<file path=customXml/item3.xml><?xml version="1.0" encoding="utf-8"?>
 <ct:contentTypeSchema xmlns:ct="http://schemas.microsoft.com/office/2006/metadata/contentType" xmlns:ma="http://schemas.microsoft.com/office/2006/metadata/properties/metaAttributes" ct:_="" ma:_="" ma:contentTypeName="Documento" ma:contentTypeID="0x010100E1B2E3D0AEEC7340A09D8FD78C38A13C" ma:contentTypeVersion="11" ma:contentTypeDescription="Crear nuevo documento." ma:contentTypeScope="" ma:versionID="adf254315a00692eabcb903ba5b3872a">
   <xsd:schema xmlns:xsd="http://www.w3.org/2001/XMLSchema" xmlns:xs="http://www.w3.org/2001/XMLSchema" xmlns:p="http://schemas.microsoft.com/office/2006/metadata/properties" xmlns:ns2="c876746a-ac9c-4dfb-b1cf-ee0dcc9f29c1" xmlns:ns3="edf58c9f-4424-4ea8-80f2-eb9a1fbfbbf7" targetNamespace="http://schemas.microsoft.com/office/2006/metadata/properties" ma:root="true" ma:fieldsID="3895c6bf242f33e2c7116a79982390c0" ns2:_="" ns3:_="">
     <xsd:import namespace="c876746a-ac9c-4dfb-b1cf-ee0dcc9f29c1"/>
@@ -9849,32 +9825,27 @@
 </ct:contentTypeSchema>
 </file>
 
-<file path=customXml/itemProps1.xml><?xml version="1.0" encoding="utf-8"?>
-<ds:datastoreItem xmlns:ds="http://schemas.openxmlformats.org/officeDocument/2006/customXml" ds:itemID="{9094623D-B19D-4F1B-931B-647D5EFCD6AA}">
-  <ds:schemaRefs>
-    <ds:schemaRef ds:uri="http://purl.org/dc/terms/"/>
-    <ds:schemaRef ds:uri="http://schemas.openxmlformats.org/package/2006/metadata/core-properties"/>
-    <ds:schemaRef ds:uri="http://purl.org/dc/dcmitype/"/>
-    <ds:schemaRef ds:uri="http://schemas.microsoft.com/office/infopath/2007/PartnerControls"/>
-    <ds:schemaRef ds:uri="http://schemas.microsoft.com/office/2006/documentManagement/types"/>
-    <ds:schemaRef ds:uri="c876746a-ac9c-4dfb-b1cf-ee0dcc9f29c1"/>
-    <ds:schemaRef ds:uri="http://purl.org/dc/elements/1.1/"/>
-    <ds:schemaRef ds:uri="http://schemas.microsoft.com/office/2006/metadata/properties"/>
-    <ds:schemaRef ds:uri="edf58c9f-4424-4ea8-80f2-eb9a1fbfbbf7"/>
-    <ds:schemaRef ds:uri="http://www.w3.org/XML/1998/namespace"/>
-  </ds:schemaRefs>
-</ds:datastoreItem>
+<file path=customXml/item2.xml><?xml version="1.0" encoding="utf-8"?>
+<?mso-contentType ?>
+<FormTemplates xmlns="http://schemas.microsoft.com/sharepoint/v3/contenttype/forms">
+  <Display>DocumentLibraryForm</Display>
+  <Edit>DocumentLibraryForm</Edit>
+  <New>DocumentLibraryForm</New>
+</FormTemplates>
 </file>
 
-<file path=customXml/itemProps2.xml><?xml version="1.0" encoding="utf-8"?>
-<ds:datastoreItem xmlns:ds="http://schemas.openxmlformats.org/officeDocument/2006/customXml" ds:itemID="{6EF8A025-7369-4270-AEEE-5ECE2C84909B}">
-  <ds:schemaRefs>
-    <ds:schemaRef ds:uri="http://schemas.microsoft.com/sharepoint/v3/contenttype/forms"/>
-  </ds:schemaRefs>
-</ds:datastoreItem>
+<file path=customXml/item3.xml><?xml version="1.0" encoding="utf-8"?>
+<p:properties xmlns:p="http://schemas.microsoft.com/office/2006/metadata/properties" xmlns:xsi="http://www.w3.org/2001/XMLSchema-instance" xmlns:pc="http://schemas.microsoft.com/office/infopath/2007/PartnerControls">
+  <documentManagement>
+    <TaxCatchAll xmlns="edf58c9f-4424-4ea8-80f2-eb9a1fbfbbf7" xsi:nil="true"/>
+    <lcf76f155ced4ddcb4097134ff3c332f xmlns="c876746a-ac9c-4dfb-b1cf-ee0dcc9f29c1">
+      <Terms xmlns="http://schemas.microsoft.com/office/infopath/2007/PartnerControls"/>
+    </lcf76f155ced4ddcb4097134ff3c332f>
+  </documentManagement>
+</p:properties>
 </file>
 
-<file path=customXml/itemProps3.xml><?xml version="1.0" encoding="utf-8"?>
+<file path=customXml/itemProps1.xml><?xml version="1.0" encoding="utf-8"?>
 <ds:datastoreItem xmlns:ds="http://schemas.openxmlformats.org/officeDocument/2006/customXml" ds:itemID="{FE84634D-D66D-4213-AE46-85387AA56D88}">
   <ds:schemaRefs>
     <ds:schemaRef ds:uri="http://schemas.microsoft.com/office/2006/metadata/contentType"/>
@@ -9891,4 +9862,29 @@
     <ds:schemaRef ds:uri="http://schemas.microsoft.com/internal/obd"/>
   </ds:schemaRefs>
 </ds:datastoreItem>
+</file>
+
+<file path=customXml/itemProps2.xml><?xml version="1.0" encoding="utf-8"?>
+<ds:datastoreItem xmlns:ds="http://schemas.openxmlformats.org/officeDocument/2006/customXml" ds:itemID="{6EF8A025-7369-4270-AEEE-5ECE2C84909B}">
+  <ds:schemaRefs>
+    <ds:schemaRef ds:uri="http://schemas.microsoft.com/sharepoint/v3/contenttype/forms"/>
+  </ds:schemaRefs>
+</ds:datastoreItem>
+</file>
+
+<file path=customXml/itemProps3.xml><?xml version="1.0" encoding="utf-8"?>
+<ds:datastoreItem xmlns:ds="http://schemas.openxmlformats.org/officeDocument/2006/customXml" ds:itemID="{9094623D-B19D-4F1B-931B-647D5EFCD6AA}">
+  <ds:schemaRefs>
+    <ds:schemaRef ds:uri="http://purl.org/dc/terms/"/>
+    <ds:schemaRef ds:uri="http://schemas.openxmlformats.org/package/2006/metadata/core-properties"/>
+    <ds:schemaRef ds:uri="http://purl.org/dc/dcmitype/"/>
+    <ds:schemaRef ds:uri="http://schemas.microsoft.com/office/infopath/2007/PartnerControls"/>
+    <ds:schemaRef ds:uri="http://schemas.microsoft.com/office/2006/documentManagement/types"/>
+    <ds:schemaRef ds:uri="c876746a-ac9c-4dfb-b1cf-ee0dcc9f29c1"/>
+    <ds:schemaRef ds:uri="http://purl.org/dc/elements/1.1/"/>
+    <ds:schemaRef ds:uri="http://schemas.microsoft.com/office/2006/metadata/properties"/>
+    <ds:schemaRef ds:uri="edf58c9f-4424-4ea8-80f2-eb9a1fbfbbf7"/>
+    <ds:schemaRef ds:uri="http://www.w3.org/XML/1998/namespace"/>
+  </ds:schemaRefs>
+</ds:datastoreItem>
 </file>
</xml_diff>